<commit_message>
Muokattu, tarvii screenshotin android appista
</commit_message>
<xml_diff>
--- a/Posteri.pptx
+++ b/Posteri.pptx
@@ -4580,7 +4580,7 @@
             </a:pPr>
             <a:r>
               <a:rPr lang="fi-FI" dirty="0"/>
-              <a:t>The management app allows the user to add, edit and delete database entries with ease. </a:t>
+              <a:t>The management app allows the user to add, edit and delete database entries with ease. Two separate databases were created to handle login and management.</a:t>
             </a:r>
           </a:p>
           <a:p>
@@ -4589,8 +4589,13 @@
             </a:pPr>
             <a:r>
               <a:rPr lang="fi-FI" dirty="0"/>
-              <a:t>The development of our mobile app was easy to start with the Android –based templates Estimote provided in their website. (kesken)</a:t>
+              <a:t>The development of our mobile app was easy to start with the Android –based templates Estimote provided in their </a:t>
             </a:r>
+            <a:r>
+              <a:rPr lang="fi-FI"/>
+              <a:t>website.</a:t>
+            </a:r>
+            <a:endParaRPr lang="fi-FI" dirty="0"/>
           </a:p>
         </p:txBody>
       </p:sp>
@@ -4924,8 +4929,29 @@
             </a:pPr>
             <a:r>
               <a:rPr lang="fi-FI" dirty="0"/>
-              <a:t>Konklyysöns</a:t>
+              <a:t>This solution is just a base for a system that would be of benefitial use to both art galleries and gallery visitors. This solution </a:t>
             </a:r>
+            <a:r>
+              <a:rPr lang="fi-FI"/>
+              <a:t>could easily be </a:t>
+            </a:r>
+            <a:r>
+              <a:rPr lang="fi-FI" dirty="0"/>
+              <a:t>expanded to take in customer feedback through </a:t>
+            </a:r>
+            <a:r>
+              <a:rPr lang="fi-FI"/>
+              <a:t>the mobile </a:t>
+            </a:r>
+            <a:r>
+              <a:rPr lang="fi-FI" dirty="0"/>
+              <a:t>app and place it to the database for the management </a:t>
+            </a:r>
+            <a:r>
+              <a:rPr lang="fi-FI"/>
+              <a:t>to read.</a:t>
+            </a:r>
+            <a:endParaRPr lang="fi-FI" dirty="0"/>
           </a:p>
           <a:p>
             <a:pPr lvl="0">
@@ -5031,7 +5057,7 @@
           <a:graphicData uri="http://schemas.openxmlformats.org/presentationml/2006/ole">
             <mc:AlternateContent xmlns:mc="http://schemas.openxmlformats.org/markup-compatibility/2006">
               <mc:Choice xmlns:v="urn:schemas-microsoft-com:vml" Requires="v">
-                <p:oleObj spid="_x0000_s1034" name="Image" r:id="rId5" imgW="9091800" imgH="7187040" progId="Photoshop.Image.11">
+                <p:oleObj spid="_x0000_s1037" name="Image" r:id="rId5" imgW="9091800" imgH="7187040" progId="Photoshop.Image.11">
                   <p:embed/>
                 </p:oleObj>
               </mc:Choice>

</xml_diff>

<commit_message>
Added mobile app picture
</commit_message>
<xml_diff>
--- a/Posteri.pptx
+++ b/Posteri.pptx
@@ -1043,6 +1043,11 @@
         </p:txBody>
       </p:sp>
     </p:spTree>
+    <p:extLst>
+      <p:ext uri="{BB962C8B-B14F-4D97-AF65-F5344CB8AC3E}">
+        <p14:creationId xmlns:p14="http://schemas.microsoft.com/office/powerpoint/2010/main" val="3930872040"/>
+      </p:ext>
+    </p:extLst>
   </p:cSld>
   <p:clrMap bg1="lt1" tx1="dk1" bg2="dk2" tx2="lt2" accent1="accent1" accent2="accent2" accent3="accent3" accent4="accent4" accent5="accent5" accent6="accent6" hlink="hlink" folHlink="folHlink"/>
   <p:notesStyle>
@@ -1234,6 +1239,11 @@
         </p:spPr>
       </p:sp>
     </p:spTree>
+    <p:extLst>
+      <p:ext uri="{BB962C8B-B14F-4D97-AF65-F5344CB8AC3E}">
+        <p14:creationId xmlns:p14="http://schemas.microsoft.com/office/powerpoint/2010/main" val="3737339481"/>
+      </p:ext>
+    </p:extLst>
   </p:cSld>
   <p:clrMapOvr>
     <a:masterClrMapping/>
@@ -3849,6 +3859,10 @@
               <a:rPr lang="en-US" dirty="0"/>
               <a:t> beacons. Our goal was to create both a management tool for the gallery to manage their database and a user-end mobile app for displaying the data from that database.</a:t>
             </a:r>
+            <a:r>
+              <a:rPr lang="fi-FI" dirty="0"/>
+              <a:t/>
+            </a:r>
             <a:br>
               <a:rPr lang="fi-FI" dirty="0"/>
             </a:br>
@@ -4749,7 +4763,7 @@
               <a:buFont typeface="Arial Narrow"/>
               <a:buNone/>
             </a:pPr>
-            <a:endParaRPr sz="1500" b="0" i="0" u="none" strike="noStrike" cap="none" dirty="0">
+            <a:endParaRPr lang="fi-FI" sz="1500" b="0" i="0" u="none" strike="noStrike" cap="none" dirty="0" smtClean="0">
               <a:solidFill>
                 <a:schemeClr val="dk1"/>
               </a:solidFill>
@@ -4777,7 +4791,27 @@
               <a:buFont typeface="Arial Narrow"/>
               <a:buNone/>
             </a:pPr>
-            <a:endParaRPr sz="1500" b="0" i="0" u="none" strike="noStrike" cap="none" dirty="0">
+            <a:endParaRPr lang="fi-FI" dirty="0"/>
+          </a:p>
+          <a:p>
+            <a:pPr marL="0" marR="0" lvl="0" indent="0" algn="l" rtl="0">
+              <a:lnSpc>
+                <a:spcPct val="100000"/>
+              </a:lnSpc>
+              <a:spcBef>
+                <a:spcPts val="300"/>
+              </a:spcBef>
+              <a:spcAft>
+                <a:spcPts val="0"/>
+              </a:spcAft>
+              <a:buClr>
+                <a:schemeClr val="dk1"/>
+              </a:buClr>
+              <a:buSzPct val="25000"/>
+              <a:buFont typeface="Arial Narrow"/>
+              <a:buNone/>
+            </a:pPr>
+            <a:endParaRPr lang="fi-FI" sz="1500" b="0" i="0" u="none" strike="noStrike" cap="none" dirty="0" smtClean="0">
               <a:solidFill>
                 <a:schemeClr val="dk1"/>
               </a:solidFill>
@@ -4805,7 +4839,27 @@
               <a:buFont typeface="Arial Narrow"/>
               <a:buNone/>
             </a:pPr>
-            <a:endParaRPr sz="1500" b="0" i="0" u="none" strike="noStrike" cap="none" dirty="0">
+            <a:endParaRPr lang="fi-FI" dirty="0"/>
+          </a:p>
+          <a:p>
+            <a:pPr marL="0" marR="0" lvl="0" indent="0" algn="l" rtl="0">
+              <a:lnSpc>
+                <a:spcPct val="100000"/>
+              </a:lnSpc>
+              <a:spcBef>
+                <a:spcPts val="300"/>
+              </a:spcBef>
+              <a:spcAft>
+                <a:spcPts val="0"/>
+              </a:spcAft>
+              <a:buClr>
+                <a:schemeClr val="dk1"/>
+              </a:buClr>
+              <a:buSzPct val="25000"/>
+              <a:buFont typeface="Arial Narrow"/>
+              <a:buNone/>
+            </a:pPr>
+            <a:endParaRPr lang="fi-FI" sz="1500" b="0" i="0" u="none" strike="noStrike" cap="none" dirty="0" smtClean="0">
               <a:solidFill>
                 <a:schemeClr val="dk1"/>
               </a:solidFill>
@@ -4833,6 +4887,138 @@
               <a:buFont typeface="Arial Narrow"/>
               <a:buNone/>
             </a:pPr>
+            <a:endParaRPr sz="1500" b="0" i="0" u="none" strike="noStrike" cap="none" dirty="0">
+              <a:solidFill>
+                <a:schemeClr val="dk1"/>
+              </a:solidFill>
+              <a:latin typeface="Arial Narrow"/>
+              <a:ea typeface="Arial Narrow"/>
+              <a:cs typeface="Arial Narrow"/>
+              <a:sym typeface="Arial Narrow"/>
+            </a:endParaRPr>
+          </a:p>
+          <a:p>
+            <a:pPr marL="0" marR="0" lvl="0" indent="0" algn="l" rtl="0">
+              <a:lnSpc>
+                <a:spcPct val="100000"/>
+              </a:lnSpc>
+              <a:spcBef>
+                <a:spcPts val="300"/>
+              </a:spcBef>
+              <a:spcAft>
+                <a:spcPts val="0"/>
+              </a:spcAft>
+              <a:buClr>
+                <a:schemeClr val="dk1"/>
+              </a:buClr>
+              <a:buSzPct val="25000"/>
+              <a:buFont typeface="Arial Narrow"/>
+              <a:buNone/>
+            </a:pPr>
+            <a:endParaRPr sz="1500" b="0" i="0" u="none" strike="noStrike" cap="none" dirty="0">
+              <a:solidFill>
+                <a:schemeClr val="dk1"/>
+              </a:solidFill>
+              <a:latin typeface="Arial Narrow"/>
+              <a:ea typeface="Arial Narrow"/>
+              <a:cs typeface="Arial Narrow"/>
+              <a:sym typeface="Arial Narrow"/>
+            </a:endParaRPr>
+          </a:p>
+          <a:p>
+            <a:pPr marL="0" marR="0" lvl="0" indent="0" algn="l" rtl="0">
+              <a:lnSpc>
+                <a:spcPct val="100000"/>
+              </a:lnSpc>
+              <a:spcBef>
+                <a:spcPts val="300"/>
+              </a:spcBef>
+              <a:spcAft>
+                <a:spcPts val="0"/>
+              </a:spcAft>
+              <a:buClr>
+                <a:schemeClr val="dk1"/>
+              </a:buClr>
+              <a:buSzPct val="25000"/>
+              <a:buFont typeface="Arial Narrow"/>
+              <a:buNone/>
+            </a:pPr>
+            <a:endParaRPr lang="fi-FI" sz="1500" b="0" i="0" u="none" strike="noStrike" cap="none" dirty="0" smtClean="0">
+              <a:solidFill>
+                <a:schemeClr val="dk1"/>
+              </a:solidFill>
+              <a:latin typeface="Arial Narrow"/>
+              <a:ea typeface="Arial Narrow"/>
+              <a:cs typeface="Arial Narrow"/>
+              <a:sym typeface="Arial Narrow"/>
+            </a:endParaRPr>
+          </a:p>
+          <a:p>
+            <a:pPr marL="0" marR="0" lvl="0" indent="0" algn="l" rtl="0">
+              <a:lnSpc>
+                <a:spcPct val="100000"/>
+              </a:lnSpc>
+              <a:spcBef>
+                <a:spcPts val="300"/>
+              </a:spcBef>
+              <a:spcAft>
+                <a:spcPts val="0"/>
+              </a:spcAft>
+              <a:buClr>
+                <a:schemeClr val="dk1"/>
+              </a:buClr>
+              <a:buSzPct val="25000"/>
+              <a:buFont typeface="Arial Narrow"/>
+              <a:buNone/>
+            </a:pPr>
+            <a:endParaRPr lang="fi-FI" dirty="0"/>
+          </a:p>
+          <a:p>
+            <a:pPr marL="0" marR="0" lvl="0" indent="0" algn="l" rtl="0">
+              <a:lnSpc>
+                <a:spcPct val="100000"/>
+              </a:lnSpc>
+              <a:spcBef>
+                <a:spcPts val="300"/>
+              </a:spcBef>
+              <a:spcAft>
+                <a:spcPts val="0"/>
+              </a:spcAft>
+              <a:buClr>
+                <a:schemeClr val="dk1"/>
+              </a:buClr>
+              <a:buSzPct val="25000"/>
+              <a:buFont typeface="Arial Narrow"/>
+              <a:buNone/>
+            </a:pPr>
+            <a:endParaRPr sz="1500" b="0" i="0" u="none" strike="noStrike" cap="none" dirty="0">
+              <a:solidFill>
+                <a:schemeClr val="dk1"/>
+              </a:solidFill>
+              <a:latin typeface="Arial Narrow"/>
+              <a:ea typeface="Arial Narrow"/>
+              <a:cs typeface="Arial Narrow"/>
+              <a:sym typeface="Arial Narrow"/>
+            </a:endParaRPr>
+          </a:p>
+          <a:p>
+            <a:pPr marL="0" marR="0" lvl="0" indent="0" algn="l" rtl="0">
+              <a:lnSpc>
+                <a:spcPct val="100000"/>
+              </a:lnSpc>
+              <a:spcBef>
+                <a:spcPts val="300"/>
+              </a:spcBef>
+              <a:spcAft>
+                <a:spcPts val="0"/>
+              </a:spcAft>
+              <a:buClr>
+                <a:schemeClr val="dk1"/>
+              </a:buClr>
+              <a:buSzPct val="25000"/>
+              <a:buFont typeface="Arial Narrow"/>
+              <a:buNone/>
+            </a:pPr>
             <a:r>
               <a:rPr lang="fi-FI" sz="1500" b="0" i="0" u="none" strike="noStrike" cap="none" dirty="0">
                 <a:solidFill>
@@ -4843,7 +5029,19 @@
                 <a:cs typeface="Arial Narrow"/>
                 <a:sym typeface="Arial Narrow"/>
               </a:rPr>
-              <a:t>FIGURE 3 Tähän kuva mobiiliappista</a:t>
+              <a:t>FIGURE 3 </a:t>
+            </a:r>
+            <a:r>
+              <a:rPr lang="fi-FI" sz="1500" b="0" i="0" u="none" strike="noStrike" cap="none" dirty="0" err="1" smtClean="0">
+                <a:solidFill>
+                  <a:schemeClr val="dk1"/>
+                </a:solidFill>
+                <a:latin typeface="Arial Narrow"/>
+                <a:ea typeface="Arial Narrow"/>
+                <a:cs typeface="Arial Narrow"/>
+                <a:sym typeface="Arial Narrow"/>
+              </a:rPr>
+              <a:t>Mobiiliapp</a:t>
             </a:r>
             <a:endParaRPr sz="1500" b="0" i="0" u="none" strike="noStrike" cap="none" dirty="0">
               <a:solidFill>
@@ -4932,26 +5130,45 @@
               <a:t>This solution is just a base for a system that would be of benefitial use to both art galleries and gallery visitors. This solution </a:t>
             </a:r>
             <a:r>
-              <a:rPr lang="fi-FI"/>
-              <a:t>could easily be </a:t>
+              <a:rPr lang="fi-FI" dirty="0" err="1"/>
+              <a:t>could</a:t>
             </a:r>
             <a:r>
               <a:rPr lang="fi-FI" dirty="0"/>
-              <a:t>expanded to take in customer feedback through </a:t>
+              <a:t> </a:t>
             </a:r>
             <a:r>
-              <a:rPr lang="fi-FI"/>
-              <a:t>the mobile </a:t>
+              <a:rPr lang="fi-FI" dirty="0" err="1"/>
+              <a:t>easily</a:t>
             </a:r>
             <a:r>
               <a:rPr lang="fi-FI" dirty="0"/>
-              <a:t>app and place it to the database for the management </a:t>
+              <a:t> </a:t>
             </a:r>
             <a:r>
-              <a:rPr lang="fi-FI"/>
-              <a:t>to read.</a:t>
+              <a:rPr lang="fi-FI" dirty="0" err="1"/>
+              <a:t>be</a:t>
             </a:r>
-            <a:endParaRPr lang="fi-FI" dirty="0"/>
+            <a:r>
+              <a:rPr lang="fi-FI" dirty="0"/>
+              <a:t> expanded to take in customer feedback through </a:t>
+            </a:r>
+            <a:r>
+              <a:rPr lang="fi-FI" dirty="0" err="1"/>
+              <a:t>the</a:t>
+            </a:r>
+            <a:r>
+              <a:rPr lang="fi-FI" dirty="0"/>
+              <a:t> mobile app and place it to the database for the management to </a:t>
+            </a:r>
+            <a:r>
+              <a:rPr lang="fi-FI" dirty="0" err="1"/>
+              <a:t>read</a:t>
+            </a:r>
+            <a:r>
+              <a:rPr lang="fi-FI" dirty="0"/>
+              <a:t>.</a:t>
+            </a:r>
           </a:p>
           <a:p>
             <a:pPr lvl="0">
@@ -5057,7 +5274,7 @@
           <a:graphicData uri="http://schemas.openxmlformats.org/presentationml/2006/ole">
             <mc:AlternateContent xmlns:mc="http://schemas.openxmlformats.org/markup-compatibility/2006">
               <mc:Choice xmlns:v="urn:schemas-microsoft-com:vml" Requires="v">
-                <p:oleObj spid="_x0000_s1037" name="Image" r:id="rId5" imgW="9091800" imgH="7187040" progId="Photoshop.Image.11">
+                <p:oleObj spid="_x0000_s1038" name="Image" r:id="rId5" imgW="9091800" imgH="7187040" progId="Photoshop.Image.11">
                   <p:embed/>
                 </p:oleObj>
               </mc:Choice>
@@ -5092,11 +5309,42 @@
           </a:graphicData>
         </a:graphic>
       </p:graphicFrame>
+      <p:pic>
+        <p:nvPicPr>
+          <p:cNvPr id="2" name="Kuva 1"/>
+          <p:cNvPicPr>
+            <a:picLocks noChangeAspect="1"/>
+          </p:cNvPicPr>
+          <p:nvPr/>
+        </p:nvPicPr>
+        <p:blipFill>
+          <a:blip r:embed="rId7"/>
+          <a:stretch>
+            <a:fillRect/>
+          </a:stretch>
+        </p:blipFill>
+        <p:spPr>
+          <a:xfrm>
+            <a:off x="6976145" y="3489056"/>
+            <a:ext cx="1639659" cy="2802602"/>
+          </a:xfrm>
+          <a:prstGeom prst="rect">
+            <a:avLst/>
+          </a:prstGeom>
+        </p:spPr>
+      </p:pic>
     </p:spTree>
   </p:cSld>
   <p:clrMapOvr>
     <a:masterClrMapping/>
   </p:clrMapOvr>
+  <p:timing>
+    <p:tnLst>
+      <p:par>
+        <p:cTn id="1" dur="indefinite" restart="never" nodeType="tmRoot"/>
+      </p:par>
+    </p:tnLst>
+  </p:timing>
 </p:sld>
 </file>
 

</xml_diff>